<commit_message>
Added PowerShell on Linux stuff
</commit_message>
<xml_diff>
--- a/Live Talks/DSC Camp 2016/slides.pptx
+++ b/Live Talks/DSC Camp 2016/slides.pptx
@@ -8,7 +8,7 @@
     <p:notesMasterId r:id="rId7"/>
   </p:notesMasterIdLst>
   <p:sldIdLst>
-    <p:sldId id="258" r:id="rId2"/>
+    <p:sldId id="262" r:id="rId2"/>
     <p:sldId id="260" r:id="rId3"/>
     <p:sldId id="257" r:id="rId4"/>
     <p:sldId id="259" r:id="rId5"/>
@@ -514,112 +514,6 @@
           <a:lstStyle/>
           <a:p>
             <a:r>
-              <a:rPr lang="en-US" dirty="0" smtClean="0"/>
-              <a:t>Hello, this is</a:t>
-            </a:r>
-            <a:r>
-              <a:rPr lang="en-US" baseline="0" dirty="0" smtClean="0"/>
-              <a:t> Adam Bertram and this is Infrastructure Testing with Pester. I’m excited to get into this course because this is a topic I’ve been focused on for some time now and has literally changed the way I write my code. Writing test code has not only made me a better coder but has also me (and others) to trust the code that we create actually does what it’s supposed to.</a:t>
-            </a:r>
-            <a:br>
-              <a:rPr lang="en-US" baseline="0" dirty="0" smtClean="0"/>
-            </a:br>
-            <a:r>
-              <a:rPr lang="en-US" baseline="0" dirty="0" smtClean="0"/>
-              <a:t/>
-            </a:r>
-            <a:br>
-              <a:rPr lang="en-US" baseline="0" dirty="0" smtClean="0"/>
-            </a:br>
-            <a:r>
-              <a:rPr lang="en-US" baseline="0" dirty="0" smtClean="0"/>
-              <a:t>This is Module 1: Introduction to Testing. In this module, we’re going to cover the scenario we’ll be working through and giving you a sense of what this testing thing is all about. </a:t>
-            </a:r>
-            <a:endParaRPr lang="en-US" dirty="0"/>
-          </a:p>
-        </p:txBody>
-      </p:sp>
-      <p:sp>
-        <p:nvSpPr>
-          <p:cNvPr id="4" name="Slide Number Placeholder 3"/>
-          <p:cNvSpPr>
-            <a:spLocks noGrp="1"/>
-          </p:cNvSpPr>
-          <p:nvPr>
-            <p:ph type="sldNum" sz="quarter" idx="10"/>
-          </p:nvPr>
-        </p:nvSpPr>
-        <p:spPr/>
-        <p:txBody>
-          <a:bodyPr/>
-          <a:lstStyle/>
-          <a:p>
-            <a:fld id="{1112285D-B62D-0345-9A0E-5D91D31CA9B6}" type="slidenum">
-              <a:rPr lang="en-US" smtClean="0"/>
-              <a:t>1</a:t>
-            </a:fld>
-            <a:endParaRPr lang="en-US"/>
-          </a:p>
-        </p:txBody>
-      </p:sp>
-    </p:spTree>
-    <p:extLst>
-      <p:ext uri="{BB962C8B-B14F-4D97-AF65-F5344CB8AC3E}">
-        <p14:creationId xmlns:p14="http://schemas.microsoft.com/office/powerpoint/2010/main" val="506217317"/>
-      </p:ext>
-    </p:extLst>
-  </p:cSld>
-  <p:clrMapOvr>
-    <a:masterClrMapping/>
-  </p:clrMapOvr>
-</p:notes>
-</file>
-
-<file path=ppt/notesSlides/notesSlide2.xml><?xml version="1.0" encoding="utf-8"?>
-<p:notes xmlns:a="http://schemas.openxmlformats.org/drawingml/2006/main" xmlns:r="http://schemas.openxmlformats.org/officeDocument/2006/relationships" xmlns:p="http://schemas.openxmlformats.org/presentationml/2006/main">
-  <p:cSld>
-    <p:spTree>
-      <p:nvGrpSpPr>
-        <p:cNvPr id="1" name=""/>
-        <p:cNvGrpSpPr/>
-        <p:nvPr/>
-      </p:nvGrpSpPr>
-      <p:grpSpPr>
-        <a:xfrm>
-          <a:off x="0" y="0"/>
-          <a:ext cx="0" cy="0"/>
-          <a:chOff x="0" y="0"/>
-          <a:chExt cx="0" cy="0"/>
-        </a:xfrm>
-      </p:grpSpPr>
-      <p:sp>
-        <p:nvSpPr>
-          <p:cNvPr id="2" name="Slide Image Placeholder 1"/>
-          <p:cNvSpPr>
-            <a:spLocks noGrp="1" noRot="1" noChangeAspect="1"/>
-          </p:cNvSpPr>
-          <p:nvPr>
-            <p:ph type="sldImg"/>
-          </p:nvPr>
-        </p:nvSpPr>
-        <p:spPr/>
-      </p:sp>
-      <p:sp>
-        <p:nvSpPr>
-          <p:cNvPr id="3" name="Notes Placeholder 2"/>
-          <p:cNvSpPr>
-            <a:spLocks noGrp="1"/>
-          </p:cNvSpPr>
-          <p:nvPr>
-            <p:ph type="body" idx="1"/>
-          </p:nvPr>
-        </p:nvSpPr>
-        <p:spPr/>
-        <p:txBody>
-          <a:bodyPr/>
-          <a:lstStyle/>
-          <a:p>
-            <a:r>
               <a:rPr lang="en-US" baseline="0" dirty="0" smtClean="0"/>
               <a:t>You’re a studious one. I know this and you’re probably going to look for other ways to learn more about Pester. And, because of that, you’re going to see a lot more examples of unit testing out there with Pester. We’re not going to cover much unit tests at all but you still need to understand how they relate to the kind of testing we’ll be working with.</a:t>
             </a:r>
@@ -704,7 +598,7 @@
 </p:notes>
 </file>
 
-<file path=ppt/notesSlides/notesSlide3.xml><?xml version="1.0" encoding="utf-8"?>
+<file path=ppt/notesSlides/notesSlide2.xml><?xml version="1.0" encoding="utf-8"?>
 <p:notes xmlns:a="http://schemas.openxmlformats.org/drawingml/2006/main" xmlns:r="http://schemas.openxmlformats.org/officeDocument/2006/relationships" xmlns:p="http://schemas.openxmlformats.org/presentationml/2006/main">
   <p:cSld>
     <p:spTree>
@@ -1441,428 +1335,6 @@
 </file>
 
 <file path=ppt/slideLayouts/slideLayout12.xml><?xml version="1.0" encoding="utf-8"?>
-<p:sldLayout xmlns:a="http://schemas.openxmlformats.org/drawingml/2006/main" xmlns:r="http://schemas.openxmlformats.org/officeDocument/2006/relationships" xmlns:p="http://schemas.openxmlformats.org/presentationml/2006/main" userDrawn="1">
-  <p:cSld name="1_Title Slide">
-    <p:spTree>
-      <p:nvGrpSpPr>
-        <p:cNvPr id="1" name=""/>
-        <p:cNvGrpSpPr/>
-        <p:nvPr/>
-      </p:nvGrpSpPr>
-      <p:grpSpPr>
-        <a:xfrm>
-          <a:off x="0" y="0"/>
-          <a:ext cx="0" cy="0"/>
-          <a:chOff x="0" y="0"/>
-          <a:chExt cx="0" cy="0"/>
-        </a:xfrm>
-      </p:grpSpPr>
-      <p:sp>
-        <p:nvSpPr>
-          <p:cNvPr id="15" name="Author Contact"/>
-          <p:cNvSpPr>
-            <a:spLocks noGrp="1"/>
-          </p:cNvSpPr>
-          <p:nvPr>
-            <p:ph type="body" sz="quarter" idx="12" hasCustomPrompt="1"/>
-          </p:nvPr>
-        </p:nvSpPr>
-        <p:spPr>
-          <a:xfrm>
-            <a:off x="2838075" y="5649116"/>
-            <a:ext cx="6038989" cy="291159"/>
-          </a:xfrm>
-        </p:spPr>
-        <p:txBody>
-          <a:bodyPr anchor="ctr"/>
-          <a:lstStyle>
-            <a:lvl1pPr marL="0" indent="0" algn="l">
-              <a:buFontTx/>
-              <a:buNone/>
-              <a:defRPr sz="1800" b="0" i="0" baseline="0">
-                <a:solidFill>
-                  <a:schemeClr val="tx1">
-                    <a:lumMod val="50000"/>
-                  </a:schemeClr>
-                </a:solidFill>
-                <a:latin typeface="Gotham Book" panose="02000604040000020004" pitchFamily="50" charset="0"/>
-                <a:ea typeface="Gotham Book" panose="02000604040000020004" pitchFamily="50" charset="0"/>
-                <a:cs typeface="Gotham Book" panose="02000604040000020004" pitchFamily="50" charset="0"/>
-              </a:defRPr>
-            </a:lvl1pPr>
-            <a:lvl2pPr>
-              <a:defRPr>
-                <a:latin typeface="+mj-lt"/>
-              </a:defRPr>
-            </a:lvl2pPr>
-            <a:lvl3pPr>
-              <a:defRPr>
-                <a:latin typeface="+mj-lt"/>
-              </a:defRPr>
-            </a:lvl3pPr>
-            <a:lvl4pPr>
-              <a:defRPr>
-                <a:latin typeface="+mj-lt"/>
-              </a:defRPr>
-            </a:lvl4pPr>
-            <a:lvl5pPr>
-              <a:defRPr>
-                <a:latin typeface="+mj-lt"/>
-              </a:defRPr>
-            </a:lvl5pPr>
-          </a:lstStyle>
-          <a:p>
-            <a:pPr lvl="0"/>
-            <a:r>
-              <a:rPr lang="en-US" dirty="0" smtClean="0"/>
-              <a:t>@</a:t>
-            </a:r>
-            <a:r>
-              <a:rPr lang="en-US" dirty="0" err="1" smtClean="0"/>
-              <a:t>authortwitter</a:t>
-            </a:r>
-            <a:r>
-              <a:rPr lang="en-US" dirty="0" smtClean="0"/>
-              <a:t>   www.authorsite.com</a:t>
-            </a:r>
-            <a:endParaRPr lang="en-US" dirty="0"/>
-          </a:p>
-        </p:txBody>
-      </p:sp>
-      <p:sp>
-        <p:nvSpPr>
-          <p:cNvPr id="12" name="Author Title"/>
-          <p:cNvSpPr>
-            <a:spLocks noGrp="1"/>
-          </p:cNvSpPr>
-          <p:nvPr>
-            <p:ph type="body" sz="quarter" idx="14" hasCustomPrompt="1"/>
-          </p:nvPr>
-        </p:nvSpPr>
-        <p:spPr>
-          <a:xfrm>
-            <a:off x="2838075" y="5297609"/>
-            <a:ext cx="6038989" cy="190400"/>
-          </a:xfrm>
-        </p:spPr>
-        <p:txBody>
-          <a:bodyPr anchor="ctr"/>
-          <a:lstStyle>
-            <a:lvl1pPr marL="0" indent="0" algn="l">
-              <a:buFontTx/>
-              <a:buNone/>
-              <a:defRPr sz="1600" b="0" i="0" cap="all" baseline="0">
-                <a:solidFill>
-                  <a:schemeClr val="tx1">
-                    <a:lumMod val="50000"/>
-                  </a:schemeClr>
-                </a:solidFill>
-                <a:latin typeface="Gotham Book" panose="02000604040000020004" pitchFamily="50" charset="0"/>
-                <a:ea typeface="Gotham Book" panose="02000604040000020004" pitchFamily="50" charset="0"/>
-                <a:cs typeface="Gotham Book" panose="02000604040000020004" pitchFamily="50" charset="0"/>
-              </a:defRPr>
-            </a:lvl1pPr>
-            <a:lvl2pPr>
-              <a:defRPr>
-                <a:latin typeface="+mj-lt"/>
-              </a:defRPr>
-            </a:lvl2pPr>
-            <a:lvl3pPr>
-              <a:defRPr>
-                <a:latin typeface="+mj-lt"/>
-              </a:defRPr>
-            </a:lvl3pPr>
-            <a:lvl4pPr>
-              <a:defRPr>
-                <a:latin typeface="+mj-lt"/>
-              </a:defRPr>
-            </a:lvl4pPr>
-            <a:lvl5pPr>
-              <a:defRPr>
-                <a:latin typeface="+mj-lt"/>
-              </a:defRPr>
-            </a:lvl5pPr>
-          </a:lstStyle>
-          <a:p>
-            <a:pPr lvl="0"/>
-            <a:r>
-              <a:rPr lang="en-US" dirty="0" smtClean="0"/>
-              <a:t>AUTHOR TITLE IN ALL CAPS  </a:t>
-            </a:r>
-            <a:endParaRPr lang="en-US" dirty="0"/>
-          </a:p>
-        </p:txBody>
-      </p:sp>
-      <p:sp>
-        <p:nvSpPr>
-          <p:cNvPr id="13" name="Author Name"/>
-          <p:cNvSpPr>
-            <a:spLocks noGrp="1"/>
-          </p:cNvSpPr>
-          <p:nvPr>
-            <p:ph type="body" sz="quarter" idx="10" hasCustomPrompt="1"/>
-          </p:nvPr>
-        </p:nvSpPr>
-        <p:spPr>
-          <a:xfrm>
-            <a:off x="2838075" y="4957764"/>
-            <a:ext cx="3544396" cy="291159"/>
-          </a:xfrm>
-        </p:spPr>
-        <p:txBody>
-          <a:bodyPr anchor="ctr"/>
-          <a:lstStyle>
-            <a:lvl1pPr marL="0" indent="0" algn="l">
-              <a:buFontTx/>
-              <a:buNone/>
-              <a:defRPr sz="2400" b="0" i="0" baseline="0">
-                <a:solidFill>
-                  <a:schemeClr val="accent1"/>
-                </a:solidFill>
-                <a:latin typeface="Gotham Medium" panose="02000604030000020004" pitchFamily="50" charset="0"/>
-                <a:ea typeface="Gotham Medium" panose="02000604030000020004" pitchFamily="50" charset="0"/>
-                <a:cs typeface="Gotham Medium" panose="02000604030000020004" pitchFamily="50" charset="0"/>
-              </a:defRPr>
-            </a:lvl1pPr>
-            <a:lvl2pPr>
-              <a:defRPr>
-                <a:latin typeface="+mj-lt"/>
-              </a:defRPr>
-            </a:lvl2pPr>
-            <a:lvl3pPr>
-              <a:defRPr>
-                <a:latin typeface="+mj-lt"/>
-              </a:defRPr>
-            </a:lvl3pPr>
-            <a:lvl4pPr>
-              <a:defRPr>
-                <a:latin typeface="+mj-lt"/>
-              </a:defRPr>
-            </a:lvl4pPr>
-            <a:lvl5pPr>
-              <a:defRPr>
-                <a:latin typeface="+mj-lt"/>
-              </a:defRPr>
-            </a:lvl5pPr>
-          </a:lstStyle>
-          <a:p>
-            <a:pPr lvl="0"/>
-            <a:r>
-              <a:rPr lang="en-US" dirty="0" smtClean="0"/>
-              <a:t>Author Name</a:t>
-            </a:r>
-            <a:endParaRPr lang="en-US" dirty="0"/>
-          </a:p>
-        </p:txBody>
-      </p:sp>
-      <p:sp>
-        <p:nvSpPr>
-          <p:cNvPr id="9" name="Picture Placeholder 2"/>
-          <p:cNvSpPr>
-            <a:spLocks noGrp="1"/>
-          </p:cNvSpPr>
-          <p:nvPr>
-            <p:ph type="pic" sz="quarter" idx="15" hasCustomPrompt="1"/>
-          </p:nvPr>
-        </p:nvSpPr>
-        <p:spPr>
-          <a:xfrm>
-            <a:off x="963976" y="4623383"/>
-            <a:ext cx="1627632" cy="1627632"/>
-          </a:xfrm>
-          <a:prstGeom prst="ellipse">
-            <a:avLst/>
-          </a:prstGeom>
-          <a:noFill/>
-          <a:ln>
-            <a:solidFill>
-              <a:srgbClr val="F8F8F8"/>
-            </a:solidFill>
-          </a:ln>
-        </p:spPr>
-        <p:txBody>
-          <a:bodyPr anchor="ctr"/>
-          <a:lstStyle>
-            <a:lvl1pPr algn="ctr">
-              <a:defRPr sz="2000" b="0" i="0">
-                <a:latin typeface="Gotham Book" panose="02000604040000020004" pitchFamily="50" charset="0"/>
-                <a:ea typeface="Gotham Book" panose="02000604040000020004" pitchFamily="50" charset="0"/>
-                <a:cs typeface="Gotham Book" panose="02000604040000020004" pitchFamily="50" charset="0"/>
-              </a:defRPr>
-            </a:lvl1pPr>
-          </a:lstStyle>
-          <a:p>
-            <a:r>
-              <a:rPr lang="en-US" dirty="0" smtClean="0"/>
-              <a:t>Click to add author photo</a:t>
-            </a:r>
-            <a:endParaRPr lang="en-US" dirty="0"/>
-          </a:p>
-        </p:txBody>
-      </p:sp>
-      <p:sp>
-        <p:nvSpPr>
-          <p:cNvPr id="8" name="Subtitle"/>
-          <p:cNvSpPr>
-            <a:spLocks noGrp="1"/>
-          </p:cNvSpPr>
-          <p:nvPr>
-            <p:ph type="body" sz="quarter" idx="13" hasCustomPrompt="1"/>
-          </p:nvPr>
-        </p:nvSpPr>
-        <p:spPr>
-          <a:xfrm>
-            <a:off x="963976" y="3293590"/>
-            <a:ext cx="10516334" cy="1006258"/>
-          </a:xfrm>
-        </p:spPr>
-        <p:txBody>
-          <a:bodyPr/>
-          <a:lstStyle>
-            <a:lvl1pPr marL="0" indent="0">
-              <a:buNone/>
-              <a:defRPr sz="2800" b="0" i="0" cap="all" baseline="0">
-                <a:solidFill>
-                  <a:schemeClr val="bg2">
-                    <a:lumMod val="10000"/>
-                  </a:schemeClr>
-                </a:solidFill>
-                <a:latin typeface="Gotham Book" panose="02000604040000020004" pitchFamily="50" charset="0"/>
-                <a:ea typeface="Gotham Book" panose="02000604040000020004" pitchFamily="50" charset="0"/>
-                <a:cs typeface="Gotham Book" panose="02000604040000020004" pitchFamily="50" charset="0"/>
-              </a:defRPr>
-            </a:lvl1pPr>
-          </a:lstStyle>
-          <a:p>
-            <a:pPr lvl="0"/>
-            <a:r>
-              <a:rPr lang="en-US" dirty="0" smtClean="0"/>
-              <a:t>MODULE ONE TITLE IN ALL CAPS</a:t>
-            </a:r>
-            <a:endParaRPr lang="en-US" dirty="0"/>
-          </a:p>
-        </p:txBody>
-      </p:sp>
-      <p:cxnSp>
-        <p:nvCxnSpPr>
-          <p:cNvPr id="14" name="Straight Connector 13"/>
-          <p:cNvCxnSpPr/>
-          <p:nvPr userDrawn="1"/>
-        </p:nvCxnSpPr>
-        <p:spPr>
-          <a:xfrm>
-            <a:off x="711695" y="2996630"/>
-            <a:ext cx="10768615" cy="0"/>
-          </a:xfrm>
-          <a:prstGeom prst="line">
-            <a:avLst/>
-          </a:prstGeom>
-          <a:ln w="38100">
-            <a:gradFill>
-              <a:gsLst>
-                <a:gs pos="0">
-                  <a:schemeClr val="accent1"/>
-                </a:gs>
-                <a:gs pos="100000">
-                  <a:srgbClr val="EC0D7D"/>
-                </a:gs>
-              </a:gsLst>
-              <a:lin ang="4800000" scaled="0"/>
-            </a:gradFill>
-            <a:headEnd type="none"/>
-            <a:tailEnd type="none"/>
-          </a:ln>
-          <a:effectLst/>
-        </p:spPr>
-        <p:style>
-          <a:lnRef idx="2">
-            <a:schemeClr val="accent1"/>
-          </a:lnRef>
-          <a:fillRef idx="0">
-            <a:schemeClr val="accent1"/>
-          </a:fillRef>
-          <a:effectRef idx="1">
-            <a:schemeClr val="accent1"/>
-          </a:effectRef>
-          <a:fontRef idx="minor">
-            <a:schemeClr val="tx1"/>
-          </a:fontRef>
-        </p:style>
-      </p:cxnSp>
-      <p:sp>
-        <p:nvSpPr>
-          <p:cNvPr id="11" name="Title 10"/>
-          <p:cNvSpPr>
-            <a:spLocks noGrp="1"/>
-          </p:cNvSpPr>
-          <p:nvPr>
-            <p:ph type="title" hasCustomPrompt="1"/>
-          </p:nvPr>
-        </p:nvSpPr>
-        <p:spPr>
-          <a:xfrm>
-            <a:off x="964084" y="394774"/>
-            <a:ext cx="10516226" cy="2381119"/>
-          </a:xfrm>
-        </p:spPr>
-        <p:txBody>
-          <a:bodyPr anchor="b"/>
-          <a:lstStyle>
-            <a:lvl1pPr algn="l">
-              <a:defRPr sz="4499" b="0" i="0" spc="-112" baseline="0">
-                <a:solidFill>
-                  <a:schemeClr val="bg2">
-                    <a:lumMod val="10000"/>
-                  </a:schemeClr>
-                </a:solidFill>
-                <a:latin typeface="Gotham Book" panose="02000604040000020004" pitchFamily="50" charset="0"/>
-                <a:ea typeface="Gotham Book" panose="02000604040000020004" pitchFamily="50" charset="0"/>
-                <a:cs typeface="Gotham Book" panose="02000604040000020004" pitchFamily="50" charset="0"/>
-              </a:defRPr>
-            </a:lvl1pPr>
-          </a:lstStyle>
-          <a:p>
-            <a:r>
-              <a:rPr lang="en-US" dirty="0" smtClean="0"/>
-              <a:t>Course/Module Title in </a:t>
-            </a:r>
-            <a:r>
-              <a:rPr lang="en-US" dirty="0" err="1" smtClean="0"/>
-              <a:t>Titlecase</a:t>
-            </a:r>
-            <a:endParaRPr lang="en-US" dirty="0"/>
-          </a:p>
-        </p:txBody>
-      </p:sp>
-    </p:spTree>
-    <p:extLst>
-      <p:ext uri="{BB962C8B-B14F-4D97-AF65-F5344CB8AC3E}">
-        <p14:creationId xmlns:p14="http://schemas.microsoft.com/office/powerpoint/2010/main" val="229182516"/>
-      </p:ext>
-    </p:extLst>
-  </p:cSld>
-  <p:clrMapOvr>
-    <a:masterClrMapping/>
-  </p:clrMapOvr>
-  <mc:AlternateContent xmlns:mc="http://schemas.openxmlformats.org/markup-compatibility/2006" xmlns:p14="http://schemas.microsoft.com/office/powerpoint/2010/main">
-    <mc:Choice Requires="p14">
-      <p:transition spd="slow" p14:dur="2000"/>
-    </mc:Choice>
-    <mc:Fallback xmlns="">
-      <p:transition spd="slow"/>
-    </mc:Fallback>
-  </mc:AlternateContent>
-  <p:timing>
-    <p:tnLst>
-      <p:par>
-        <p:cTn id="1" dur="indefinite" restart="never" nodeType="tmRoot"/>
-      </p:par>
-    </p:tnLst>
-  </p:timing>
-</p:sldLayout>
-</file>
-
-<file path=ppt/slideLayouts/slideLayout13.xml><?xml version="1.0" encoding="utf-8"?>
 <p:sldLayout xmlns:a="http://schemas.openxmlformats.org/drawingml/2006/main" xmlns:r="http://schemas.openxmlformats.org/officeDocument/2006/relationships" xmlns:p="http://schemas.openxmlformats.org/presentationml/2006/main" userDrawn="1">
   <p:cSld name="Demo (Optional)">
     <p:spTree>
@@ -3201,7 +2673,7 @@
 </p:sldLayout>
 </file>
 
-<file path=ppt/slideLayouts/slideLayout14.xml><?xml version="1.0" encoding="utf-8"?>
+<file path=ppt/slideLayouts/slideLayout13.xml><?xml version="1.0" encoding="utf-8"?>
 <p:sldLayout xmlns:a="http://schemas.openxmlformats.org/drawingml/2006/main" xmlns:r="http://schemas.openxmlformats.org/officeDocument/2006/relationships" xmlns:p="http://schemas.openxmlformats.org/presentationml/2006/main" userDrawn="1">
   <p:cSld name="Four Image Chunking">
     <p:spTree>
@@ -5673,9 +5145,8 @@
     <p:sldLayoutId id="2147483657" r:id="rId9"/>
     <p:sldLayoutId id="2147483658" r:id="rId10"/>
     <p:sldLayoutId id="2147483659" r:id="rId11"/>
-    <p:sldLayoutId id="2147483660" r:id="rId12"/>
-    <p:sldLayoutId id="2147483661" r:id="rId13"/>
-    <p:sldLayoutId id="2147483662" r:id="rId14"/>
+    <p:sldLayoutId id="2147483661" r:id="rId12"/>
+    <p:sldLayoutId id="2147483662" r:id="rId13"/>
   </p:sldLayoutIdLst>
   <p:txStyles>
     <p:titleStyle>
@@ -5977,198 +5448,40 @@
           <a:chExt cx="0" cy="0"/>
         </a:xfrm>
       </p:grpSpPr>
-      <p:sp>
-        <p:nvSpPr>
-          <p:cNvPr id="4" name="Text Placeholder 3"/>
-          <p:cNvSpPr>
-            <a:spLocks noGrp="1"/>
-          </p:cNvSpPr>
-          <p:nvPr>
-            <p:ph type="body" sz="quarter" idx="12"/>
-          </p:nvPr>
-        </p:nvSpPr>
-        <p:spPr/>
-        <p:txBody>
-          <a:bodyPr>
-            <a:normAutofit fontScale="92500" lnSpcReduction="20000"/>
-          </a:bodyPr>
-          <a:lstStyle/>
-          <a:p>
-            <a:r>
-              <a:rPr lang="en-US" dirty="0" smtClean="0"/>
-              <a:t>@</a:t>
-            </a:r>
-            <a:r>
-              <a:rPr lang="en-US" dirty="0" err="1" smtClean="0"/>
-              <a:t>adbertram</a:t>
-            </a:r>
-            <a:r>
-              <a:rPr lang="en-US" dirty="0" smtClean="0"/>
-              <a:t>   </a:t>
-            </a:r>
-            <a:r>
-              <a:rPr lang="en-US" dirty="0" err="1" smtClean="0"/>
-              <a:t>www.adamtheautomator.com</a:t>
-            </a:r>
-            <a:endParaRPr lang="en-US" dirty="0"/>
-          </a:p>
-        </p:txBody>
-      </p:sp>
-      <p:sp>
-        <p:nvSpPr>
-          <p:cNvPr id="18" name="Text Placeholder 17"/>
-          <p:cNvSpPr>
-            <a:spLocks noGrp="1"/>
-          </p:cNvSpPr>
-          <p:nvPr>
-            <p:ph type="body" sz="quarter" idx="14"/>
-          </p:nvPr>
-        </p:nvSpPr>
-        <p:spPr>
-          <a:xfrm>
-            <a:off x="2838075" y="5297609"/>
-            <a:ext cx="6297216" cy="162665"/>
-          </a:xfrm>
-        </p:spPr>
-        <p:txBody>
-          <a:bodyPr>
-            <a:normAutofit fontScale="40000" lnSpcReduction="20000"/>
-          </a:bodyPr>
-          <a:lstStyle/>
-          <a:p>
-            <a:r>
-              <a:rPr lang="en-US" dirty="0" smtClean="0"/>
-              <a:t>Microsoft Cloud and Datacenter Management MVP</a:t>
-            </a:r>
-            <a:endParaRPr lang="en-US" dirty="0"/>
-          </a:p>
-        </p:txBody>
-      </p:sp>
-      <p:sp>
-        <p:nvSpPr>
-          <p:cNvPr id="3" name="Text Placeholder 2"/>
-          <p:cNvSpPr>
-            <a:spLocks noGrp="1"/>
-          </p:cNvSpPr>
-          <p:nvPr>
-            <p:ph type="body" sz="quarter" idx="10"/>
-          </p:nvPr>
-        </p:nvSpPr>
-        <p:spPr/>
-        <p:txBody>
-          <a:bodyPr>
-            <a:normAutofit fontScale="70000" lnSpcReduction="20000"/>
-          </a:bodyPr>
-          <a:lstStyle/>
-          <a:p>
-            <a:r>
-              <a:rPr lang="en-US" dirty="0" smtClean="0"/>
-              <a:t>Adam Bertram</a:t>
-            </a:r>
-            <a:endParaRPr lang="en-US" dirty="0"/>
-          </a:p>
-        </p:txBody>
-      </p:sp>
       <p:pic>
         <p:nvPicPr>
-          <p:cNvPr id="13" name="Picture Placeholder 12"/>
+          <p:cNvPr id="2" name="Picture 1"/>
           <p:cNvPicPr>
-            <a:picLocks noGrp="1" noChangeAspect="1"/>
+            <a:picLocks noChangeAspect="1"/>
           </p:cNvPicPr>
-          <p:nvPr>
-            <p:ph type="pic" sz="quarter" idx="15"/>
-          </p:nvPr>
+          <p:nvPr/>
         </p:nvPicPr>
         <p:blipFill>
-          <a:blip r:embed="rId3">
-            <a:extLst>
-              <a:ext uri="{28A0092B-C50C-407E-A947-70E740481C1C}">
-                <a14:useLocalDpi xmlns:a14="http://schemas.microsoft.com/office/drawing/2010/main" val="0"/>
-              </a:ext>
-            </a:extLst>
-          </a:blip>
+          <a:blip r:embed="rId2"/>
           <a:stretch>
             <a:fillRect/>
           </a:stretch>
         </p:blipFill>
         <p:spPr>
           <a:xfrm>
-            <a:off x="963976" y="4662929"/>
-            <a:ext cx="1627632" cy="1548539"/>
+            <a:off x="2033895" y="146998"/>
+            <a:ext cx="8488528" cy="6366396"/>
           </a:xfrm>
+          <a:prstGeom prst="rect">
+            <a:avLst/>
+          </a:prstGeom>
         </p:spPr>
       </p:pic>
-      <p:sp>
-        <p:nvSpPr>
-          <p:cNvPr id="5" name="Text Placeholder 4"/>
-          <p:cNvSpPr>
-            <a:spLocks noGrp="1"/>
-          </p:cNvSpPr>
-          <p:nvPr>
-            <p:ph type="body" sz="quarter" idx="13"/>
-          </p:nvPr>
-        </p:nvSpPr>
-        <p:spPr/>
-        <p:txBody>
-          <a:bodyPr/>
-          <a:lstStyle/>
-          <a:p>
-            <a:r>
-              <a:rPr lang="en-US" dirty="0" smtClean="0"/>
-              <a:t>You can do this!</a:t>
-            </a:r>
-            <a:endParaRPr lang="en-US" dirty="0"/>
-          </a:p>
-        </p:txBody>
-      </p:sp>
-      <p:sp>
-        <p:nvSpPr>
-          <p:cNvPr id="2" name="Title 1"/>
-          <p:cNvSpPr>
-            <a:spLocks noGrp="1"/>
-          </p:cNvSpPr>
-          <p:nvPr>
-            <p:ph type="title"/>
-          </p:nvPr>
-        </p:nvSpPr>
-        <p:spPr/>
-        <p:txBody>
-          <a:bodyPr/>
-          <a:lstStyle/>
-          <a:p>
-            <a:r>
-              <a:rPr lang="en-US" dirty="0" smtClean="0"/>
-              <a:t>Pester Unit Testing is Not Scary</a:t>
-            </a:r>
-            <a:endParaRPr lang="en-US" dirty="0"/>
-          </a:p>
-        </p:txBody>
-      </p:sp>
     </p:spTree>
     <p:extLst>
       <p:ext uri="{BB962C8B-B14F-4D97-AF65-F5344CB8AC3E}">
-        <p14:creationId xmlns:p14="http://schemas.microsoft.com/office/powerpoint/2010/main" val="1432367341"/>
+        <p14:creationId xmlns:p14="http://schemas.microsoft.com/office/powerpoint/2010/main" val="1045802356"/>
       </p:ext>
     </p:extLst>
   </p:cSld>
   <p:clrMapOvr>
     <a:masterClrMapping/>
   </p:clrMapOvr>
-  <mc:AlternateContent xmlns:mc="http://schemas.openxmlformats.org/markup-compatibility/2006" xmlns:p14="http://schemas.microsoft.com/office/powerpoint/2010/main">
-    <mc:Choice Requires="p14">
-      <p:transition spd="slow" p14:dur="2000"/>
-    </mc:Choice>
-    <mc:Fallback xmlns="">
-      <p:transition spd="slow"/>
-    </mc:Fallback>
-  </mc:AlternateContent>
-  <p:timing>
-    <p:tnLst>
-      <p:par>
-        <p:cTn id="1" dur="indefinite" restart="never" nodeType="tmRoot"/>
-      </p:par>
-    </p:tnLst>
-  </p:timing>
 </p:sld>
 </file>
 

</xml_diff>